<commit_message>
020812 Dokumentasjon og siste fiks av kode
</commit_message>
<xml_diff>
--- a/ppt/siste-pres.pptx
+++ b/ppt/siste-pres.pptx
@@ -9,8 +9,9 @@
     <p:sldId id="257" r:id="rId3"/>
     <p:sldId id="258" r:id="rId4"/>
     <p:sldId id="262" r:id="rId5"/>
-    <p:sldId id="259" r:id="rId6"/>
-    <p:sldId id="263" r:id="rId7"/>
+    <p:sldId id="264" r:id="rId6"/>
+    <p:sldId id="259" r:id="rId7"/>
+    <p:sldId id="263" r:id="rId8"/>
   </p:sldIdLst>
   <p:sldSz cx="9144000" cy="6858000" type="screen4x3"/>
   <p:notesSz cx="6858000" cy="9144000"/>
@@ -293,7 +294,7 @@
           <a:p>
             <a:fld id="{956F3A92-C621-4DC7-9D8B-63C33BC1EBA5}" type="datetimeFigureOut">
               <a:rPr lang="nb-NO" smtClean="0"/>
-              <a:t>31.07.2012</a:t>
+              <a:t>02.08.2012</a:t>
             </a:fld>
             <a:endParaRPr lang="nb-NO"/>
           </a:p>
@@ -463,7 +464,7 @@
           <a:p>
             <a:fld id="{956F3A92-C621-4DC7-9D8B-63C33BC1EBA5}" type="datetimeFigureOut">
               <a:rPr lang="nb-NO" smtClean="0"/>
-              <a:t>31.07.2012</a:t>
+              <a:t>02.08.2012</a:t>
             </a:fld>
             <a:endParaRPr lang="nb-NO"/>
           </a:p>
@@ -643,7 +644,7 @@
           <a:p>
             <a:fld id="{956F3A92-C621-4DC7-9D8B-63C33BC1EBA5}" type="datetimeFigureOut">
               <a:rPr lang="nb-NO" smtClean="0"/>
-              <a:t>31.07.2012</a:t>
+              <a:t>02.08.2012</a:t>
             </a:fld>
             <a:endParaRPr lang="nb-NO"/>
           </a:p>
@@ -813,7 +814,7 @@
           <a:p>
             <a:fld id="{956F3A92-C621-4DC7-9D8B-63C33BC1EBA5}" type="datetimeFigureOut">
               <a:rPr lang="nb-NO" smtClean="0"/>
-              <a:t>31.07.2012</a:t>
+              <a:t>02.08.2012</a:t>
             </a:fld>
             <a:endParaRPr lang="nb-NO"/>
           </a:p>
@@ -1059,7 +1060,7 @@
           <a:p>
             <a:fld id="{956F3A92-C621-4DC7-9D8B-63C33BC1EBA5}" type="datetimeFigureOut">
               <a:rPr lang="nb-NO" smtClean="0"/>
-              <a:t>31.07.2012</a:t>
+              <a:t>02.08.2012</a:t>
             </a:fld>
             <a:endParaRPr lang="nb-NO"/>
           </a:p>
@@ -1347,7 +1348,7 @@
           <a:p>
             <a:fld id="{956F3A92-C621-4DC7-9D8B-63C33BC1EBA5}" type="datetimeFigureOut">
               <a:rPr lang="nb-NO" smtClean="0"/>
-              <a:t>31.07.2012</a:t>
+              <a:t>02.08.2012</a:t>
             </a:fld>
             <a:endParaRPr lang="nb-NO"/>
           </a:p>
@@ -1769,7 +1770,7 @@
           <a:p>
             <a:fld id="{956F3A92-C621-4DC7-9D8B-63C33BC1EBA5}" type="datetimeFigureOut">
               <a:rPr lang="nb-NO" smtClean="0"/>
-              <a:t>31.07.2012</a:t>
+              <a:t>02.08.2012</a:t>
             </a:fld>
             <a:endParaRPr lang="nb-NO"/>
           </a:p>
@@ -1887,7 +1888,7 @@
           <a:p>
             <a:fld id="{956F3A92-C621-4DC7-9D8B-63C33BC1EBA5}" type="datetimeFigureOut">
               <a:rPr lang="nb-NO" smtClean="0"/>
-              <a:t>31.07.2012</a:t>
+              <a:t>02.08.2012</a:t>
             </a:fld>
             <a:endParaRPr lang="nb-NO"/>
           </a:p>
@@ -1982,7 +1983,7 @@
           <a:p>
             <a:fld id="{956F3A92-C621-4DC7-9D8B-63C33BC1EBA5}" type="datetimeFigureOut">
               <a:rPr lang="nb-NO" smtClean="0"/>
-              <a:t>31.07.2012</a:t>
+              <a:t>02.08.2012</a:t>
             </a:fld>
             <a:endParaRPr lang="nb-NO"/>
           </a:p>
@@ -2259,7 +2260,7 @@
           <a:p>
             <a:fld id="{956F3A92-C621-4DC7-9D8B-63C33BC1EBA5}" type="datetimeFigureOut">
               <a:rPr lang="nb-NO" smtClean="0"/>
-              <a:t>31.07.2012</a:t>
+              <a:t>02.08.2012</a:t>
             </a:fld>
             <a:endParaRPr lang="nb-NO"/>
           </a:p>
@@ -2512,7 +2513,7 @@
           <a:p>
             <a:fld id="{956F3A92-C621-4DC7-9D8B-63C33BC1EBA5}" type="datetimeFigureOut">
               <a:rPr lang="nb-NO" smtClean="0"/>
-              <a:t>31.07.2012</a:t>
+              <a:t>02.08.2012</a:t>
             </a:fld>
             <a:endParaRPr lang="nb-NO"/>
           </a:p>
@@ -2725,7 +2726,7 @@
           <a:p>
             <a:fld id="{956F3A92-C621-4DC7-9D8B-63C33BC1EBA5}" type="datetimeFigureOut">
               <a:rPr lang="nb-NO" smtClean="0"/>
-              <a:t>31.07.2012</a:t>
+              <a:t>02.08.2012</a:t>
             </a:fld>
             <a:endParaRPr lang="nb-NO"/>
           </a:p>
@@ -3443,15 +3444,6 @@
                 <a:tailEnd/>
               </a14:hiddenLine>
             </a:ext>
-            <a:ext uri="{AF507438-7753-43E0-B8FC-AC1667EBCBE1}">
-              <a14:hiddenEffects xmlns:a14="http://schemas.microsoft.com/office/drawing/2010/main">
-                <a:effectLst>
-                  <a:outerShdw dist="35921" dir="2700000" algn="ctr" rotWithShape="0">
-                    <a:schemeClr val="bg2"/>
-                  </a:outerShdw>
-                </a:effectLst>
-              </a14:hiddenEffects>
-            </a:ext>
           </a:extLst>
         </p:spPr>
       </p:pic>
@@ -3936,7 +3928,7 @@
           <a:graphicData uri="http://schemas.openxmlformats.org/presentationml/2006/ole">
             <mc:AlternateContent xmlns:mc="http://schemas.openxmlformats.org/markup-compatibility/2006">
               <mc:Choice xmlns:v="urn:schemas-microsoft-com:vml" Requires="v">
-                <p:oleObj spid="_x0000_s4104" name="Presentasjon" r:id="rId3" imgW="3157696" imgH="5014093" progId="PowerPoint.Show.12">
+                <p:oleObj spid="_x0000_s4107" name="Presentasjon" r:id="rId3" imgW="3157696" imgH="5014093" progId="PowerPoint.Show.12">
                   <p:embed/>
                 </p:oleObj>
               </mc:Choice>
@@ -4073,6 +4065,104 @@
 <file path=ppt/slides/slide5.xml><?xml version="1.0" encoding="utf-8"?>
 <p:sld xmlns:a="http://schemas.openxmlformats.org/drawingml/2006/main" xmlns:r="http://schemas.openxmlformats.org/officeDocument/2006/relationships" xmlns:p="http://schemas.openxmlformats.org/presentationml/2006/main">
   <p:cSld>
+    <p:spTree>
+      <p:nvGrpSpPr>
+        <p:cNvPr id="1" name=""/>
+        <p:cNvGrpSpPr/>
+        <p:nvPr/>
+      </p:nvGrpSpPr>
+      <p:grpSpPr>
+        <a:xfrm>
+          <a:off x="0" y="0"/>
+          <a:ext cx="0" cy="0"/>
+          <a:chOff x="0" y="0"/>
+          <a:chExt cx="0" cy="0"/>
+        </a:xfrm>
+      </p:grpSpPr>
+      <p:pic>
+        <p:nvPicPr>
+          <p:cNvPr id="5123" name="Picture 3"/>
+          <p:cNvPicPr>
+            <a:picLocks noChangeAspect="1" noChangeArrowheads="1"/>
+          </p:cNvPicPr>
+          <p:nvPr/>
+        </p:nvPicPr>
+        <p:blipFill>
+          <a:blip r:embed="rId2">
+            <a:extLst>
+              <a:ext uri="{28A0092B-C50C-407E-A947-70E740481C1C}">
+                <a14:useLocalDpi xmlns:a14="http://schemas.microsoft.com/office/drawing/2010/main" val="0"/>
+              </a:ext>
+            </a:extLst>
+          </a:blip>
+          <a:srcRect/>
+          <a:stretch>
+            <a:fillRect/>
+          </a:stretch>
+        </p:blipFill>
+        <p:spPr bwMode="auto">
+          <a:xfrm>
+            <a:off x="857250" y="536575"/>
+            <a:ext cx="7429500" cy="5784850"/>
+          </a:xfrm>
+          <a:prstGeom prst="rect">
+            <a:avLst/>
+          </a:prstGeom>
+          <a:noFill/>
+          <a:ln w="57150">
+            <a:solidFill>
+              <a:schemeClr val="accent1">
+                <a:lumMod val="75000"/>
+              </a:schemeClr>
+            </a:solidFill>
+            <a:miter lim="800000"/>
+            <a:headEnd/>
+            <a:tailEnd/>
+          </a:ln>
+          <a:effectLst/>
+          <a:extLst>
+            <a:ext uri="{909E8E84-426E-40DD-AFC4-6F175D3DCCD1}">
+              <a14:hiddenFill xmlns:a14="http://schemas.microsoft.com/office/drawing/2010/main">
+                <a:solidFill>
+                  <a:schemeClr val="accent1"/>
+                </a:solidFill>
+              </a14:hiddenFill>
+            </a:ext>
+            <a:ext uri="{AF507438-7753-43E0-B8FC-AC1667EBCBE1}">
+              <a14:hiddenEffects xmlns:a14="http://schemas.microsoft.com/office/drawing/2010/main">
+                <a:effectLst>
+                  <a:outerShdw dist="35921" dir="2700000" algn="ctr" rotWithShape="0">
+                    <a:schemeClr val="bg2"/>
+                  </a:outerShdw>
+                </a:effectLst>
+              </a14:hiddenEffects>
+            </a:ext>
+          </a:extLst>
+        </p:spPr>
+      </p:pic>
+    </p:spTree>
+    <p:extLst>
+      <p:ext uri="{BB962C8B-B14F-4D97-AF65-F5344CB8AC3E}">
+        <p14:creationId xmlns:p14="http://schemas.microsoft.com/office/powerpoint/2010/main" val="1748276730"/>
+      </p:ext>
+    </p:extLst>
+  </p:cSld>
+  <p:clrMapOvr>
+    <a:masterClrMapping/>
+  </p:clrMapOvr>
+  <p:timing>
+    <p:tnLst>
+      <p:par>
+        <p:cTn id="1" dur="indefinite" restart="never" nodeType="tmRoot"/>
+      </p:par>
+    </p:tnLst>
+  </p:timing>
+</p:sld>
+</file>
+
+<file path=ppt/slides/slide6.xml><?xml version="1.0" encoding="utf-8"?>
+<p:sld xmlns:a="http://schemas.openxmlformats.org/drawingml/2006/main" xmlns:r="http://schemas.openxmlformats.org/officeDocument/2006/relationships" xmlns:p="http://schemas.openxmlformats.org/presentationml/2006/main">
+  <p:cSld>
     <p:bg>
       <p:bgPr>
         <a:solidFill>
@@ -4116,7 +4206,7 @@
         </p:blipFill>
         <p:spPr bwMode="auto">
           <a:xfrm>
-            <a:off x="6914673" y="104094"/>
+            <a:off x="6804248" y="104094"/>
             <a:ext cx="2337847" cy="6709282"/>
           </a:xfrm>
           <a:prstGeom prst="rect">
@@ -4389,7 +4479,7 @@
 </p:sld>
 </file>
 
-<file path=ppt/slides/slide6.xml><?xml version="1.0" encoding="utf-8"?>
+<file path=ppt/slides/slide7.xml><?xml version="1.0" encoding="utf-8"?>
 <p:sld xmlns:a="http://schemas.openxmlformats.org/drawingml/2006/main" xmlns:r="http://schemas.openxmlformats.org/officeDocument/2006/relationships" xmlns:p="http://schemas.openxmlformats.org/presentationml/2006/main">
   <p:cSld>
     <p:spTree>

</xml_diff>